<commit_message>
se actualizaron cambios por el cliente
</commit_message>
<xml_diff>
--- a/02_Implementación/02_DiseñoGeneral/Dsiseño Conceptual.pptx
+++ b/02_Implementación/02_DiseñoGeneral/Dsiseño Conceptual.pptx
@@ -104,6 +104,11 @@
       </a:defRPr>
     </a:lvl9pPr>
   </p:defaultTextStyle>
+  <p:extLst>
+    <p:ext uri="{EFAFB233-063F-42B5-8137-9DF3F51BA10A}">
+      <p15:sldGuideLst xmlns:p15="http://schemas.microsoft.com/office/powerpoint/2012/main"/>
+    </p:ext>
+  </p:extLst>
 </p:presentation>
 </file>
 
@@ -256,7 +261,7 @@
           <a:p>
             <a:fld id="{C1D58486-BF84-47E5-B566-72F2FFD57F0A}" type="datetimeFigureOut">
               <a:rPr lang="es-MX" smtClean="0"/>
-              <a:t>28/02/2020</a:t>
+              <a:t>03/03/2020</a:t>
             </a:fld>
             <a:endParaRPr lang="es-MX"/>
           </a:p>
@@ -456,7 +461,7 @@
           <a:p>
             <a:fld id="{C1D58486-BF84-47E5-B566-72F2FFD57F0A}" type="datetimeFigureOut">
               <a:rPr lang="es-MX" smtClean="0"/>
-              <a:t>28/02/2020</a:t>
+              <a:t>03/03/2020</a:t>
             </a:fld>
             <a:endParaRPr lang="es-MX"/>
           </a:p>
@@ -666,7 +671,7 @@
           <a:p>
             <a:fld id="{C1D58486-BF84-47E5-B566-72F2FFD57F0A}" type="datetimeFigureOut">
               <a:rPr lang="es-MX" smtClean="0"/>
-              <a:t>28/02/2020</a:t>
+              <a:t>03/03/2020</a:t>
             </a:fld>
             <a:endParaRPr lang="es-MX"/>
           </a:p>
@@ -866,7 +871,7 @@
           <a:p>
             <a:fld id="{C1D58486-BF84-47E5-B566-72F2FFD57F0A}" type="datetimeFigureOut">
               <a:rPr lang="es-MX" smtClean="0"/>
-              <a:t>28/02/2020</a:t>
+              <a:t>03/03/2020</a:t>
             </a:fld>
             <a:endParaRPr lang="es-MX"/>
           </a:p>
@@ -1142,7 +1147,7 @@
           <a:p>
             <a:fld id="{C1D58486-BF84-47E5-B566-72F2FFD57F0A}" type="datetimeFigureOut">
               <a:rPr lang="es-MX" smtClean="0"/>
-              <a:t>28/02/2020</a:t>
+              <a:t>03/03/2020</a:t>
             </a:fld>
             <a:endParaRPr lang="es-MX"/>
           </a:p>
@@ -1410,7 +1415,7 @@
           <a:p>
             <a:fld id="{C1D58486-BF84-47E5-B566-72F2FFD57F0A}" type="datetimeFigureOut">
               <a:rPr lang="es-MX" smtClean="0"/>
-              <a:t>28/02/2020</a:t>
+              <a:t>03/03/2020</a:t>
             </a:fld>
             <a:endParaRPr lang="es-MX"/>
           </a:p>
@@ -1825,7 +1830,7 @@
           <a:p>
             <a:fld id="{C1D58486-BF84-47E5-B566-72F2FFD57F0A}" type="datetimeFigureOut">
               <a:rPr lang="es-MX" smtClean="0"/>
-              <a:t>28/02/2020</a:t>
+              <a:t>03/03/2020</a:t>
             </a:fld>
             <a:endParaRPr lang="es-MX"/>
           </a:p>
@@ -1967,7 +1972,7 @@
           <a:p>
             <a:fld id="{C1D58486-BF84-47E5-B566-72F2FFD57F0A}" type="datetimeFigureOut">
               <a:rPr lang="es-MX" smtClean="0"/>
-              <a:t>28/02/2020</a:t>
+              <a:t>03/03/2020</a:t>
             </a:fld>
             <a:endParaRPr lang="es-MX"/>
           </a:p>
@@ -2080,7 +2085,7 @@
           <a:p>
             <a:fld id="{C1D58486-BF84-47E5-B566-72F2FFD57F0A}" type="datetimeFigureOut">
               <a:rPr lang="es-MX" smtClean="0"/>
-              <a:t>28/02/2020</a:t>
+              <a:t>03/03/2020</a:t>
             </a:fld>
             <a:endParaRPr lang="es-MX"/>
           </a:p>
@@ -2393,7 +2398,7 @@
           <a:p>
             <a:fld id="{C1D58486-BF84-47E5-B566-72F2FFD57F0A}" type="datetimeFigureOut">
               <a:rPr lang="es-MX" smtClean="0"/>
-              <a:t>28/02/2020</a:t>
+              <a:t>03/03/2020</a:t>
             </a:fld>
             <a:endParaRPr lang="es-MX"/>
           </a:p>
@@ -2682,7 +2687,7 @@
           <a:p>
             <a:fld id="{C1D58486-BF84-47E5-B566-72F2FFD57F0A}" type="datetimeFigureOut">
               <a:rPr lang="es-MX" smtClean="0"/>
-              <a:t>28/02/2020</a:t>
+              <a:t>03/03/2020</a:t>
             </a:fld>
             <a:endParaRPr lang="es-MX"/>
           </a:p>
@@ -2925,7 +2930,7 @@
           <a:p>
             <a:fld id="{C1D58486-BF84-47E5-B566-72F2FFD57F0A}" type="datetimeFigureOut">
               <a:rPr lang="es-MX" smtClean="0"/>
-              <a:t>28/02/2020</a:t>
+              <a:t>03/03/2020</a:t>
             </a:fld>
             <a:endParaRPr lang="es-MX"/>
           </a:p>
@@ -3387,7 +3392,7 @@
             <a:pPr algn="ctr"/>
             <a:r>
               <a:rPr lang="es-MX" dirty="0"/>
-              <a:t>Municipio:</a:t>
+              <a:t>Geolocalización:</a:t>
             </a:r>
           </a:p>
           <a:p>
@@ -3398,7 +3403,7 @@
             <a:pPr algn="ctr"/>
             <a:r>
               <a:rPr lang="es-MX" dirty="0"/>
-              <a:t>Plantel:</a:t>
+              <a:t>Subsistema :</a:t>
             </a:r>
           </a:p>
           <a:p>
@@ -3409,7 +3414,7 @@
             <a:pPr algn="ctr"/>
             <a:r>
               <a:rPr lang="es-MX" dirty="0"/>
-              <a:t>Grado:</a:t>
+              <a:t>Plantel :</a:t>
             </a:r>
           </a:p>
           <a:p>
@@ -3436,7 +3441,7 @@
         </p:nvSpPr>
         <p:spPr>
           <a:xfrm>
-            <a:off x="5867400" y="800100"/>
+            <a:off x="6067425" y="786027"/>
             <a:ext cx="1524000" cy="361950"/>
           </a:xfrm>
           <a:prstGeom prst="rect">
@@ -3480,7 +3485,7 @@
         </p:nvSpPr>
         <p:spPr>
           <a:xfrm>
-            <a:off x="5867400" y="1295400"/>
+            <a:off x="6067425" y="1279710"/>
             <a:ext cx="1524000" cy="361950"/>
           </a:xfrm>
           <a:prstGeom prst="rect">
@@ -3524,7 +3529,7 @@
         </p:nvSpPr>
         <p:spPr>
           <a:xfrm>
-            <a:off x="5867400" y="1800225"/>
+            <a:off x="6067425" y="1761544"/>
             <a:ext cx="1524000" cy="361950"/>
           </a:xfrm>
           <a:prstGeom prst="rect">
@@ -3568,8 +3573,8 @@
         </p:nvSpPr>
         <p:spPr>
           <a:xfrm>
-            <a:off x="4476750" y="666750"/>
-            <a:ext cx="3124200" cy="1905000"/>
+            <a:off x="4476749" y="666750"/>
+            <a:ext cx="3348031" cy="1905000"/>
           </a:xfrm>
           <a:prstGeom prst="rect">
             <a:avLst/>
@@ -4085,14 +4090,15 @@
             </a:extLst>
           </p:cNvPr>
           <p:cNvCxnSpPr>
+            <a:cxnSpLocks/>
             <a:stCxn id="8" idx="1"/>
           </p:cNvCxnSpPr>
           <p:nvPr/>
         </p:nvCxnSpPr>
         <p:spPr>
           <a:xfrm flipH="1">
-            <a:off x="1752600" y="1619250"/>
-            <a:ext cx="2724150" cy="0"/>
+            <a:off x="1752601" y="1619250"/>
+            <a:ext cx="2724148" cy="0"/>
           </a:xfrm>
           <a:prstGeom prst="line">
             <a:avLst/>
@@ -4615,7 +4621,7 @@
         </p:nvSpPr>
         <p:spPr>
           <a:xfrm>
-            <a:off x="7824789" y="3567378"/>
+            <a:off x="7824780" y="4912730"/>
             <a:ext cx="2266950" cy="2209800"/>
           </a:xfrm>
           <a:prstGeom prst="rect">
@@ -4690,7 +4696,7 @@
         </p:nvSpPr>
         <p:spPr>
           <a:xfrm>
-            <a:off x="8348660" y="3466623"/>
+            <a:off x="8491538" y="4805481"/>
             <a:ext cx="3124200" cy="1905000"/>
           </a:xfrm>
           <a:prstGeom prst="rect">
@@ -4736,7 +4742,7 @@
         </p:nvSpPr>
         <p:spPr>
           <a:xfrm>
-            <a:off x="9377360" y="2977157"/>
+            <a:off x="9483378" y="4461344"/>
             <a:ext cx="3124200" cy="369332"/>
           </a:xfrm>
           <a:prstGeom prst="rect">
@@ -4774,7 +4780,7 @@
         </p:nvSpPr>
         <p:spPr>
           <a:xfrm>
-            <a:off x="8567740" y="3910635"/>
+            <a:off x="8524876" y="5243399"/>
             <a:ext cx="2776537" cy="369333"/>
           </a:xfrm>
           <a:prstGeom prst="rect">
@@ -4837,7 +4843,7 @@
         </p:nvSpPr>
         <p:spPr>
           <a:xfrm>
-            <a:off x="8567740" y="3905726"/>
+            <a:off x="8577264" y="5258375"/>
             <a:ext cx="2671760" cy="1370052"/>
           </a:xfrm>
           <a:prstGeom prst="rect">
@@ -4920,7 +4926,7 @@
         </p:nvSpPr>
         <p:spPr>
           <a:xfrm>
-            <a:off x="9258299" y="734589"/>
+            <a:off x="3836201" y="5325521"/>
             <a:ext cx="1062040" cy="1579418"/>
           </a:xfrm>
           <a:prstGeom prst="can">
@@ -4966,7 +4972,7 @@
         </p:nvSpPr>
         <p:spPr>
           <a:xfrm>
-            <a:off x="9296399" y="269412"/>
+            <a:off x="2552700" y="5942936"/>
             <a:ext cx="3124200" cy="369332"/>
           </a:xfrm>
           <a:prstGeom prst="rect">
@@ -4992,10 +4998,10 @@
       </p:sp>
       <p:cxnSp>
         <p:nvCxnSpPr>
-          <p:cNvPr id="50" name="Conector recto 49">
-            <a:extLst>
-              <a:ext uri="{FF2B5EF4-FFF2-40B4-BE49-F238E27FC236}">
-                <a16:creationId xmlns:a16="http://schemas.microsoft.com/office/drawing/2014/main" id="{3A95564E-DE1A-475B-95FA-41F6F0AD54B4}"/>
+          <p:cNvPr id="55" name="Conector recto 54">
+            <a:extLst>
+              <a:ext uri="{FF2B5EF4-FFF2-40B4-BE49-F238E27FC236}">
+                <a16:creationId xmlns:a16="http://schemas.microsoft.com/office/drawing/2014/main" id="{57F5F38B-37C5-41EF-82AF-63F51738CC0B}"/>
               </a:ext>
             </a:extLst>
           </p:cNvPr>
@@ -5005,9 +5011,9 @@
           <p:nvPr/>
         </p:nvCxnSpPr>
         <p:spPr>
-          <a:xfrm flipV="1">
-            <a:off x="11153773" y="1638300"/>
-            <a:ext cx="0" cy="1828324"/>
+          <a:xfrm>
+            <a:off x="4933950" y="6115230"/>
+            <a:ext cx="3557588" cy="0"/>
           </a:xfrm>
           <a:prstGeom prst="line">
             <a:avLst/>
@@ -5028,12 +5034,112 @@
           </a:fontRef>
         </p:style>
       </p:cxnSp>
+      <p:sp>
+        <p:nvSpPr>
+          <p:cNvPr id="3" name="Flecha: cheurón 2">
+            <a:extLst>
+              <a:ext uri="{FF2B5EF4-FFF2-40B4-BE49-F238E27FC236}">
+                <a16:creationId xmlns:a16="http://schemas.microsoft.com/office/drawing/2014/main" id="{CD4951FB-F4C4-487C-8BFF-DB5C82CC6CD2}"/>
+              </a:ext>
+            </a:extLst>
+          </p:cNvPr>
+          <p:cNvSpPr/>
+          <p:nvPr/>
+        </p:nvSpPr>
+        <p:spPr>
+          <a:xfrm rot="5400000">
+            <a:off x="7385701" y="1454173"/>
+            <a:ext cx="191092" cy="220355"/>
+          </a:xfrm>
+          <a:prstGeom prst="chevron">
+            <a:avLst/>
+          </a:prstGeom>
+        </p:spPr>
+        <p:style>
+          <a:lnRef idx="2">
+            <a:schemeClr val="dk1">
+              <a:shade val="50000"/>
+            </a:schemeClr>
+          </a:lnRef>
+          <a:fillRef idx="1">
+            <a:schemeClr val="dk1"/>
+          </a:fillRef>
+          <a:effectRef idx="0">
+            <a:schemeClr val="dk1"/>
+          </a:effectRef>
+          <a:fontRef idx="minor">
+            <a:schemeClr val="lt1"/>
+          </a:fontRef>
+        </p:style>
+        <p:txBody>
+          <a:bodyPr rtlCol="0" anchor="ctr"/>
+          <a:lstStyle/>
+          <a:p>
+            <a:pPr algn="ctr"/>
+            <a:endParaRPr lang="es-MX">
+              <a:solidFill>
+                <a:schemeClr val="tx1"/>
+              </a:solidFill>
+            </a:endParaRPr>
+          </a:p>
+        </p:txBody>
+      </p:sp>
+      <p:sp>
+        <p:nvSpPr>
+          <p:cNvPr id="44" name="Flecha: cheurón 43">
+            <a:extLst>
+              <a:ext uri="{FF2B5EF4-FFF2-40B4-BE49-F238E27FC236}">
+                <a16:creationId xmlns:a16="http://schemas.microsoft.com/office/drawing/2014/main" id="{225905CA-3474-42E5-BE65-5EFAD64632E4}"/>
+              </a:ext>
+            </a:extLst>
+          </p:cNvPr>
+          <p:cNvSpPr/>
+          <p:nvPr/>
+        </p:nvSpPr>
+        <p:spPr>
+          <a:xfrm rot="5400000">
+            <a:off x="7375221" y="1923196"/>
+            <a:ext cx="191092" cy="220355"/>
+          </a:xfrm>
+          <a:prstGeom prst="chevron">
+            <a:avLst/>
+          </a:prstGeom>
+        </p:spPr>
+        <p:style>
+          <a:lnRef idx="2">
+            <a:schemeClr val="dk1">
+              <a:shade val="50000"/>
+            </a:schemeClr>
+          </a:lnRef>
+          <a:fillRef idx="1">
+            <a:schemeClr val="dk1"/>
+          </a:fillRef>
+          <a:effectRef idx="0">
+            <a:schemeClr val="dk1"/>
+          </a:effectRef>
+          <a:fontRef idx="minor">
+            <a:schemeClr val="lt1"/>
+          </a:fontRef>
+        </p:style>
+        <p:txBody>
+          <a:bodyPr rtlCol="0" anchor="ctr"/>
+          <a:lstStyle/>
+          <a:p>
+            <a:pPr algn="ctr"/>
+            <a:endParaRPr lang="es-MX">
+              <a:solidFill>
+                <a:schemeClr val="tx1"/>
+              </a:solidFill>
+            </a:endParaRPr>
+          </a:p>
+        </p:txBody>
+      </p:sp>
       <p:cxnSp>
         <p:nvCxnSpPr>
-          <p:cNvPr id="55" name="Conector recto 54">
-            <a:extLst>
-              <a:ext uri="{FF2B5EF4-FFF2-40B4-BE49-F238E27FC236}">
-                <a16:creationId xmlns:a16="http://schemas.microsoft.com/office/drawing/2014/main" id="{57F5F38B-37C5-41EF-82AF-63F51738CC0B}"/>
+          <p:cNvPr id="47" name="Conector recto 46">
+            <a:extLst>
+              <a:ext uri="{FF2B5EF4-FFF2-40B4-BE49-F238E27FC236}">
+                <a16:creationId xmlns:a16="http://schemas.microsoft.com/office/drawing/2014/main" id="{322A0BEE-B964-4EEB-A490-51DA79466913}"/>
               </a:ext>
             </a:extLst>
           </p:cNvPr>
@@ -5043,9 +5149,377 @@
           <p:nvPr/>
         </p:nvCxnSpPr>
         <p:spPr>
-          <a:xfrm>
-            <a:off x="10320339" y="1657350"/>
-            <a:ext cx="833434" cy="0"/>
+          <a:xfrm flipV="1">
+            <a:off x="8348660" y="2921291"/>
+            <a:ext cx="0" cy="1520289"/>
+          </a:xfrm>
+          <a:prstGeom prst="line">
+            <a:avLst/>
+          </a:prstGeom>
+        </p:spPr>
+        <p:style>
+          <a:lnRef idx="1">
+            <a:schemeClr val="dk1"/>
+          </a:lnRef>
+          <a:fillRef idx="0">
+            <a:schemeClr val="dk1"/>
+          </a:fillRef>
+          <a:effectRef idx="0">
+            <a:schemeClr val="dk1"/>
+          </a:effectRef>
+          <a:fontRef idx="minor">
+            <a:schemeClr val="tx1"/>
+          </a:fontRef>
+        </p:style>
+      </p:cxnSp>
+      <p:sp>
+        <p:nvSpPr>
+          <p:cNvPr id="51" name="Rectángulo 50">
+            <a:extLst>
+              <a:ext uri="{FF2B5EF4-FFF2-40B4-BE49-F238E27FC236}">
+                <a16:creationId xmlns:a16="http://schemas.microsoft.com/office/drawing/2014/main" id="{C4169CA5-15AF-4F3F-BF4B-078B9B54A84F}"/>
+              </a:ext>
+            </a:extLst>
+          </p:cNvPr>
+          <p:cNvSpPr/>
+          <p:nvPr/>
+        </p:nvSpPr>
+        <p:spPr>
+          <a:xfrm>
+            <a:off x="8491538" y="1460204"/>
+            <a:ext cx="3124200" cy="2293597"/>
+          </a:xfrm>
+          <a:prstGeom prst="rect">
+            <a:avLst/>
+          </a:prstGeom>
+          <a:noFill/>
+          <a:ln/>
+        </p:spPr>
+        <p:style>
+          <a:lnRef idx="2">
+            <a:schemeClr val="accent1"/>
+          </a:lnRef>
+          <a:fillRef idx="1">
+            <a:schemeClr val="lt1"/>
+          </a:fillRef>
+          <a:effectRef idx="0">
+            <a:schemeClr val="accent1"/>
+          </a:effectRef>
+          <a:fontRef idx="minor">
+            <a:schemeClr val="dk1"/>
+          </a:fontRef>
+        </p:style>
+        <p:txBody>
+          <a:bodyPr rtlCol="0" anchor="ctr"/>
+          <a:lstStyle/>
+          <a:p>
+            <a:pPr algn="ctr"/>
+            <a:endParaRPr lang="es-MX"/>
+          </a:p>
+        </p:txBody>
+      </p:sp>
+      <p:sp>
+        <p:nvSpPr>
+          <p:cNvPr id="52" name="CuadroTexto 51">
+            <a:extLst>
+              <a:ext uri="{FF2B5EF4-FFF2-40B4-BE49-F238E27FC236}">
+                <a16:creationId xmlns:a16="http://schemas.microsoft.com/office/drawing/2014/main" id="{4313FDE5-7099-446D-87F6-2BACB5FF4E47}"/>
+              </a:ext>
+            </a:extLst>
+          </p:cNvPr>
+          <p:cNvSpPr txBox="1"/>
+          <p:nvPr/>
+        </p:nvSpPr>
+        <p:spPr>
+          <a:xfrm>
+            <a:off x="9483378" y="1116068"/>
+            <a:ext cx="3124200" cy="369332"/>
+          </a:xfrm>
+          <a:prstGeom prst="rect">
+            <a:avLst/>
+          </a:prstGeom>
+          <a:noFill/>
+          <a:ln>
+            <a:noFill/>
+          </a:ln>
+        </p:spPr>
+        <p:txBody>
+          <a:bodyPr wrap="square" rtlCol="0">
+            <a:spAutoFit/>
+          </a:bodyPr>
+          <a:lstStyle/>
+          <a:p>
+            <a:r>
+              <a:rPr lang="es-MX" dirty="0"/>
+              <a:t>Información</a:t>
+            </a:r>
+          </a:p>
+        </p:txBody>
+      </p:sp>
+      <p:sp>
+        <p:nvSpPr>
+          <p:cNvPr id="53" name="Rectángulo 52">
+            <a:extLst>
+              <a:ext uri="{FF2B5EF4-FFF2-40B4-BE49-F238E27FC236}">
+                <a16:creationId xmlns:a16="http://schemas.microsoft.com/office/drawing/2014/main" id="{8745C8FE-B066-4320-AEE5-2BA35953F58B}"/>
+              </a:ext>
+            </a:extLst>
+          </p:cNvPr>
+          <p:cNvSpPr/>
+          <p:nvPr/>
+        </p:nvSpPr>
+        <p:spPr>
+          <a:xfrm>
+            <a:off x="8524876" y="1898123"/>
+            <a:ext cx="2776537" cy="369333"/>
+          </a:xfrm>
+          <a:prstGeom prst="rect">
+            <a:avLst/>
+          </a:prstGeom>
+          <a:noFill/>
+          <a:ln>
+            <a:noFill/>
+          </a:ln>
+        </p:spPr>
+        <p:style>
+          <a:lnRef idx="2">
+            <a:schemeClr val="accent5"/>
+          </a:lnRef>
+          <a:fillRef idx="1">
+            <a:schemeClr val="lt1"/>
+          </a:fillRef>
+          <a:effectRef idx="0">
+            <a:schemeClr val="accent5"/>
+          </a:effectRef>
+          <a:fontRef idx="minor">
+            <a:schemeClr val="dk1"/>
+          </a:fontRef>
+        </p:style>
+        <p:txBody>
+          <a:bodyPr rtlCol="0" anchor="ctr"/>
+          <a:lstStyle/>
+          <a:p>
+            <a:pPr algn="ctr"/>
+            <a:r>
+              <a:rPr lang="es-MX" dirty="0"/>
+              <a:t>Nombre del Eje Transversal</a:t>
+            </a:r>
+          </a:p>
+          <a:p>
+            <a:pPr algn="ctr"/>
+            <a:endParaRPr lang="es-MX" dirty="0"/>
+          </a:p>
+          <a:p>
+            <a:pPr algn="ctr"/>
+            <a:endParaRPr lang="es-MX" dirty="0"/>
+          </a:p>
+          <a:p>
+            <a:pPr algn="ctr"/>
+            <a:endParaRPr lang="es-MX" dirty="0"/>
+          </a:p>
+        </p:txBody>
+      </p:sp>
+      <p:sp>
+        <p:nvSpPr>
+          <p:cNvPr id="54" name="Rectángulo 53">
+            <a:extLst>
+              <a:ext uri="{FF2B5EF4-FFF2-40B4-BE49-F238E27FC236}">
+                <a16:creationId xmlns:a16="http://schemas.microsoft.com/office/drawing/2014/main" id="{2BD3F83A-CD5B-4234-8C85-1722B186F816}"/>
+              </a:ext>
+            </a:extLst>
+          </p:cNvPr>
+          <p:cNvSpPr/>
+          <p:nvPr/>
+        </p:nvSpPr>
+        <p:spPr>
+          <a:xfrm>
+            <a:off x="8577263" y="1913099"/>
+            <a:ext cx="2840975" cy="1370052"/>
+          </a:xfrm>
+          <a:prstGeom prst="rect">
+            <a:avLst/>
+          </a:prstGeom>
+          <a:noFill/>
+        </p:spPr>
+        <p:style>
+          <a:lnRef idx="2">
+            <a:schemeClr val="accent5"/>
+          </a:lnRef>
+          <a:fillRef idx="1">
+            <a:schemeClr val="lt1"/>
+          </a:fillRef>
+          <a:effectRef idx="0">
+            <a:schemeClr val="accent5"/>
+          </a:effectRef>
+          <a:fontRef idx="minor">
+            <a:schemeClr val="dk1"/>
+          </a:fontRef>
+        </p:style>
+        <p:txBody>
+          <a:bodyPr rtlCol="0" anchor="ctr"/>
+          <a:lstStyle/>
+          <a:p>
+            <a:pPr algn="ctr"/>
+            <a:endParaRPr lang="es-MX"/>
+          </a:p>
+        </p:txBody>
+      </p:sp>
+      <p:cxnSp>
+        <p:nvCxnSpPr>
+          <p:cNvPr id="56" name="Conector recto 55">
+            <a:extLst>
+              <a:ext uri="{FF2B5EF4-FFF2-40B4-BE49-F238E27FC236}">
+                <a16:creationId xmlns:a16="http://schemas.microsoft.com/office/drawing/2014/main" id="{4D29DEFE-71BF-46B0-90F8-CFB1DC343B56}"/>
+              </a:ext>
+            </a:extLst>
+          </p:cNvPr>
+          <p:cNvCxnSpPr>
+            <a:cxnSpLocks/>
+          </p:cNvCxnSpPr>
+          <p:nvPr/>
+        </p:nvCxnSpPr>
+        <p:spPr>
+          <a:xfrm flipV="1">
+            <a:off x="8348660" y="2876550"/>
+            <a:ext cx="133353" cy="31627"/>
+          </a:xfrm>
+          <a:prstGeom prst="line">
+            <a:avLst/>
+          </a:prstGeom>
+        </p:spPr>
+        <p:style>
+          <a:lnRef idx="1">
+            <a:schemeClr val="dk1"/>
+          </a:lnRef>
+          <a:fillRef idx="0">
+            <a:schemeClr val="dk1"/>
+          </a:fillRef>
+          <a:effectRef idx="0">
+            <a:schemeClr val="dk1"/>
+          </a:effectRef>
+          <a:fontRef idx="minor">
+            <a:schemeClr val="tx1"/>
+          </a:fontRef>
+        </p:style>
+      </p:cxnSp>
+      <p:sp>
+        <p:nvSpPr>
+          <p:cNvPr id="57" name="Rectángulo 56">
+            <a:extLst>
+              <a:ext uri="{FF2B5EF4-FFF2-40B4-BE49-F238E27FC236}">
+                <a16:creationId xmlns:a16="http://schemas.microsoft.com/office/drawing/2014/main" id="{9F32E13D-EAE9-4983-8341-5C22E1BA01E1}"/>
+              </a:ext>
+            </a:extLst>
+          </p:cNvPr>
+          <p:cNvSpPr/>
+          <p:nvPr/>
+        </p:nvSpPr>
+        <p:spPr>
+          <a:xfrm>
+            <a:off x="8608364" y="2091300"/>
+            <a:ext cx="3124200" cy="1006147"/>
+          </a:xfrm>
+          <a:prstGeom prst="rect">
+            <a:avLst/>
+          </a:prstGeom>
+          <a:noFill/>
+          <a:ln>
+            <a:noFill/>
+          </a:ln>
+        </p:spPr>
+        <p:style>
+          <a:lnRef idx="2">
+            <a:schemeClr val="accent5"/>
+          </a:lnRef>
+          <a:fillRef idx="1">
+            <a:schemeClr val="lt1"/>
+          </a:fillRef>
+          <a:effectRef idx="0">
+            <a:schemeClr val="accent5"/>
+          </a:effectRef>
+          <a:fontRef idx="minor">
+            <a:schemeClr val="dk1"/>
+          </a:fontRef>
+        </p:style>
+        <p:txBody>
+          <a:bodyPr rtlCol="0" anchor="ctr"/>
+          <a:lstStyle/>
+          <a:p>
+            <a:r>
+              <a:rPr lang="es-MX" dirty="0"/>
+              <a:t>El acoso sexual es la intimidación o acoso de naturaleza sexual o violación, promesas no deseadas o inapropiada…</a:t>
+            </a:r>
+          </a:p>
+        </p:txBody>
+      </p:sp>
+      <p:sp>
+        <p:nvSpPr>
+          <p:cNvPr id="25" name="Rectángulo 24">
+            <a:extLst>
+              <a:ext uri="{FF2B5EF4-FFF2-40B4-BE49-F238E27FC236}">
+                <a16:creationId xmlns:a16="http://schemas.microsoft.com/office/drawing/2014/main" id="{6014C84B-551D-40FE-8C78-C985997658D4}"/>
+              </a:ext>
+            </a:extLst>
+          </p:cNvPr>
+          <p:cNvSpPr/>
+          <p:nvPr/>
+        </p:nvSpPr>
+        <p:spPr>
+          <a:xfrm>
+            <a:off x="9227444" y="3363595"/>
+            <a:ext cx="1818034" cy="332279"/>
+          </a:xfrm>
+          <a:prstGeom prst="rect">
+            <a:avLst/>
+          </a:prstGeom>
+        </p:spPr>
+        <p:style>
+          <a:lnRef idx="2">
+            <a:schemeClr val="accent1">
+              <a:shade val="50000"/>
+            </a:schemeClr>
+          </a:lnRef>
+          <a:fillRef idx="1">
+            <a:schemeClr val="accent1"/>
+          </a:fillRef>
+          <a:effectRef idx="0">
+            <a:schemeClr val="accent1"/>
+          </a:effectRef>
+          <a:fontRef idx="minor">
+            <a:schemeClr val="lt1"/>
+          </a:fontRef>
+        </p:style>
+        <p:txBody>
+          <a:bodyPr rtlCol="0" anchor="ctr"/>
+          <a:lstStyle/>
+          <a:p>
+            <a:pPr algn="ctr"/>
+            <a:r>
+              <a:rPr lang="es-MX" dirty="0"/>
+              <a:t>Realizar Encuesta</a:t>
+            </a:r>
+          </a:p>
+        </p:txBody>
+      </p:sp>
+      <p:cxnSp>
+        <p:nvCxnSpPr>
+          <p:cNvPr id="58" name="Conector recto 57">
+            <a:extLst>
+              <a:ext uri="{FF2B5EF4-FFF2-40B4-BE49-F238E27FC236}">
+                <a16:creationId xmlns:a16="http://schemas.microsoft.com/office/drawing/2014/main" id="{82D179CE-6255-4235-8326-4011D41FAA98}"/>
+              </a:ext>
+            </a:extLst>
+          </p:cNvPr>
+          <p:cNvCxnSpPr>
+            <a:cxnSpLocks/>
+            <a:endCxn id="42" idx="2"/>
+          </p:cNvCxnSpPr>
+          <p:nvPr/>
+        </p:nvCxnSpPr>
+        <p:spPr>
+          <a:xfrm>
+            <a:off x="10439400" y="3768777"/>
+            <a:ext cx="606078" cy="1061899"/>
           </a:xfrm>
           <a:prstGeom prst="line">
             <a:avLst/>

</xml_diff>